<commit_message>
Remove redundant animations created during duplicate
</commit_message>
<xml_diff>
--- a/doc/test/AnimationLab/AnimateInSlide.pptx
+++ b/doc/test/AnimationLab/AnimateInSlide.pptx
@@ -1595,7 +1595,7 @@
           <a:p>
             <a:fld id="{48E32F65-35C4-4EA7-AB30-C882F6C87A5D}" type="datetimeFigureOut">
               <a:rPr lang="en-SG" smtClean="0"/>
-              <a:t>1/28/2017</a:t>
+              <a:t>13/7/2017</a:t>
             </a:fld>
             <a:endParaRPr lang="en-SG"/>
           </a:p>
@@ -2482,7 +2482,7 @@
           <a:p>
             <a:fld id="{699DC775-C286-4358-8C92-D7E584E969B3}" type="datetimeFigureOut">
               <a:rPr lang="en-US" smtClean="0"/>
-              <a:t>1/28/2017</a:t>
+              <a:t>7/13/2017</a:t>
             </a:fld>
             <a:endParaRPr lang="en-US"/>
           </a:p>
@@ -2652,7 +2652,7 @@
           <a:p>
             <a:fld id="{699DC775-C286-4358-8C92-D7E584E969B3}" type="datetimeFigureOut">
               <a:rPr lang="en-US" smtClean="0"/>
-              <a:t>1/28/2017</a:t>
+              <a:t>7/13/2017</a:t>
             </a:fld>
             <a:endParaRPr lang="en-US"/>
           </a:p>
@@ -2832,7 +2832,7 @@
           <a:p>
             <a:fld id="{699DC775-C286-4358-8C92-D7E584E969B3}" type="datetimeFigureOut">
               <a:rPr lang="en-US" smtClean="0"/>
-              <a:t>1/28/2017</a:t>
+              <a:t>7/13/2017</a:t>
             </a:fld>
             <a:endParaRPr lang="en-US"/>
           </a:p>
@@ -3074,7 +3074,7 @@
           <a:p>
             <a:fld id="{699DC775-C286-4358-8C92-D7E584E969B3}" type="datetimeFigureOut">
               <a:rPr lang="en-US" smtClean="0"/>
-              <a:t>1/28/2017</a:t>
+              <a:t>7/13/2017</a:t>
             </a:fld>
             <a:endParaRPr lang="en-US"/>
           </a:p>
@@ -3244,7 +3244,7 @@
           <a:p>
             <a:fld id="{699DC775-C286-4358-8C92-D7E584E969B3}" type="datetimeFigureOut">
               <a:rPr lang="en-US" smtClean="0"/>
-              <a:t>1/28/2017</a:t>
+              <a:t>7/13/2017</a:t>
             </a:fld>
             <a:endParaRPr lang="en-US"/>
           </a:p>
@@ -3490,7 +3490,7 @@
           <a:p>
             <a:fld id="{699DC775-C286-4358-8C92-D7E584E969B3}" type="datetimeFigureOut">
               <a:rPr lang="en-US" smtClean="0"/>
-              <a:t>1/28/2017</a:t>
+              <a:t>7/13/2017</a:t>
             </a:fld>
             <a:endParaRPr lang="en-US"/>
           </a:p>
@@ -3778,7 +3778,7 @@
           <a:p>
             <a:fld id="{699DC775-C286-4358-8C92-D7E584E969B3}" type="datetimeFigureOut">
               <a:rPr lang="en-US" smtClean="0"/>
-              <a:t>1/28/2017</a:t>
+              <a:t>7/13/2017</a:t>
             </a:fld>
             <a:endParaRPr lang="en-US"/>
           </a:p>
@@ -4200,7 +4200,7 @@
           <a:p>
             <a:fld id="{699DC775-C286-4358-8C92-D7E584E969B3}" type="datetimeFigureOut">
               <a:rPr lang="en-US" smtClean="0"/>
-              <a:t>1/28/2017</a:t>
+              <a:t>7/13/2017</a:t>
             </a:fld>
             <a:endParaRPr lang="en-US"/>
           </a:p>
@@ -4318,7 +4318,7 @@
           <a:p>
             <a:fld id="{699DC775-C286-4358-8C92-D7E584E969B3}" type="datetimeFigureOut">
               <a:rPr lang="en-US" smtClean="0"/>
-              <a:t>1/28/2017</a:t>
+              <a:t>7/13/2017</a:t>
             </a:fld>
             <a:endParaRPr lang="en-US"/>
           </a:p>
@@ -4413,7 +4413,7 @@
           <a:p>
             <a:fld id="{699DC775-C286-4358-8C92-D7E584E969B3}" type="datetimeFigureOut">
               <a:rPr lang="en-US" smtClean="0"/>
-              <a:t>1/28/2017</a:t>
+              <a:t>7/13/2017</a:t>
             </a:fld>
             <a:endParaRPr lang="en-US"/>
           </a:p>
@@ -4690,7 +4690,7 @@
           <a:p>
             <a:fld id="{699DC775-C286-4358-8C92-D7E584E969B3}" type="datetimeFigureOut">
               <a:rPr lang="en-US" smtClean="0"/>
-              <a:t>1/28/2017</a:t>
+              <a:t>7/13/2017</a:t>
             </a:fld>
             <a:endParaRPr lang="en-US"/>
           </a:p>
@@ -4860,7 +4860,7 @@
           <a:p>
             <a:fld id="{699DC775-C286-4358-8C92-D7E584E969B3}" type="datetimeFigureOut">
               <a:rPr lang="en-US" smtClean="0"/>
-              <a:t>1/28/2017</a:t>
+              <a:t>7/13/2017</a:t>
             </a:fld>
             <a:endParaRPr lang="en-US"/>
           </a:p>
@@ -5113,7 +5113,7 @@
           <a:p>
             <a:fld id="{699DC775-C286-4358-8C92-D7E584E969B3}" type="datetimeFigureOut">
               <a:rPr lang="en-US" smtClean="0"/>
-              <a:t>1/28/2017</a:t>
+              <a:t>7/13/2017</a:t>
             </a:fld>
             <a:endParaRPr lang="en-US"/>
           </a:p>
@@ -5283,7 +5283,7 @@
           <a:p>
             <a:fld id="{699DC775-C286-4358-8C92-D7E584E969B3}" type="datetimeFigureOut">
               <a:rPr lang="en-US" smtClean="0"/>
-              <a:t>1/28/2017</a:t>
+              <a:t>7/13/2017</a:t>
             </a:fld>
             <a:endParaRPr lang="en-US"/>
           </a:p>
@@ -5463,7 +5463,7 @@
           <a:p>
             <a:fld id="{699DC775-C286-4358-8C92-D7E584E969B3}" type="datetimeFigureOut">
               <a:rPr lang="en-US" smtClean="0"/>
-              <a:t>1/28/2017</a:t>
+              <a:t>7/13/2017</a:t>
             </a:fld>
             <a:endParaRPr lang="en-US"/>
           </a:p>
@@ -5713,7 +5713,7 @@
           <a:p>
             <a:fld id="{699DC775-C286-4358-8C92-D7E584E969B3}" type="datetimeFigureOut">
               <a:rPr lang="en-US" smtClean="0"/>
-              <a:t>1/28/2017</a:t>
+              <a:t>7/13/2017</a:t>
             </a:fld>
             <a:endParaRPr lang="en-US"/>
           </a:p>
@@ -5891,7 +5891,7 @@
           <a:p>
             <a:fld id="{699DC775-C286-4358-8C92-D7E584E969B3}" type="datetimeFigureOut">
               <a:rPr lang="en-US" smtClean="0"/>
-              <a:t>1/28/2017</a:t>
+              <a:t>7/13/2017</a:t>
             </a:fld>
             <a:endParaRPr lang="en-US"/>
           </a:p>
@@ -6145,7 +6145,7 @@
           <a:p>
             <a:fld id="{699DC775-C286-4358-8C92-D7E584E969B3}" type="datetimeFigureOut">
               <a:rPr lang="en-US" smtClean="0"/>
-              <a:t>1/28/2017</a:t>
+              <a:t>7/13/2017</a:t>
             </a:fld>
             <a:endParaRPr lang="en-US"/>
           </a:p>
@@ -6441,7 +6441,7 @@
           <a:p>
             <a:fld id="{699DC775-C286-4358-8C92-D7E584E969B3}" type="datetimeFigureOut">
               <a:rPr lang="en-US" smtClean="0"/>
-              <a:t>1/28/2017</a:t>
+              <a:t>7/13/2017</a:t>
             </a:fld>
             <a:endParaRPr lang="en-US"/>
           </a:p>
@@ -6871,7 +6871,7 @@
           <a:p>
             <a:fld id="{699DC775-C286-4358-8C92-D7E584E969B3}" type="datetimeFigureOut">
               <a:rPr lang="en-US" smtClean="0"/>
-              <a:t>1/28/2017</a:t>
+              <a:t>7/13/2017</a:t>
             </a:fld>
             <a:endParaRPr lang="en-US"/>
           </a:p>
@@ -6997,7 +6997,7 @@
           <a:p>
             <a:fld id="{699DC775-C286-4358-8C92-D7E584E969B3}" type="datetimeFigureOut">
               <a:rPr lang="en-US" smtClean="0"/>
-              <a:t>1/28/2017</a:t>
+              <a:t>7/13/2017</a:t>
             </a:fld>
             <a:endParaRPr lang="en-US"/>
           </a:p>
@@ -7100,7 +7100,7 @@
           <a:p>
             <a:fld id="{699DC775-C286-4358-8C92-D7E584E969B3}" type="datetimeFigureOut">
               <a:rPr lang="en-US" smtClean="0"/>
-              <a:t>1/28/2017</a:t>
+              <a:t>7/13/2017</a:t>
             </a:fld>
             <a:endParaRPr lang="en-US"/>
           </a:p>
@@ -7346,7 +7346,7 @@
           <a:p>
             <a:fld id="{699DC775-C286-4358-8C92-D7E584E969B3}" type="datetimeFigureOut">
               <a:rPr lang="en-US" smtClean="0"/>
-              <a:t>1/28/2017</a:t>
+              <a:t>7/13/2017</a:t>
             </a:fld>
             <a:endParaRPr lang="en-US"/>
           </a:p>
@@ -7631,7 +7631,7 @@
           <a:p>
             <a:fld id="{699DC775-C286-4358-8C92-D7E584E969B3}" type="datetimeFigureOut">
               <a:rPr lang="en-US" smtClean="0"/>
-              <a:t>1/28/2017</a:t>
+              <a:t>7/13/2017</a:t>
             </a:fld>
             <a:endParaRPr lang="en-US"/>
           </a:p>
@@ -7892,7 +7892,7 @@
           <a:p>
             <a:fld id="{699DC775-C286-4358-8C92-D7E584E969B3}" type="datetimeFigureOut">
               <a:rPr lang="en-US" smtClean="0"/>
-              <a:t>1/28/2017</a:t>
+              <a:t>7/13/2017</a:t>
             </a:fld>
             <a:endParaRPr lang="en-US"/>
           </a:p>
@@ -8070,7 +8070,7 @@
           <a:p>
             <a:fld id="{699DC775-C286-4358-8C92-D7E584E969B3}" type="datetimeFigureOut">
               <a:rPr lang="en-US" smtClean="0"/>
-              <a:t>1/28/2017</a:t>
+              <a:t>7/13/2017</a:t>
             </a:fld>
             <a:endParaRPr lang="en-US"/>
           </a:p>
@@ -8258,7 +8258,7 @@
           <a:p>
             <a:fld id="{699DC775-C286-4358-8C92-D7E584E969B3}" type="datetimeFigureOut">
               <a:rPr lang="en-US" smtClean="0"/>
-              <a:t>1/28/2017</a:t>
+              <a:t>7/13/2017</a:t>
             </a:fld>
             <a:endParaRPr lang="en-US"/>
           </a:p>
@@ -8546,7 +8546,7 @@
           <a:p>
             <a:fld id="{699DC775-C286-4358-8C92-D7E584E969B3}" type="datetimeFigureOut">
               <a:rPr lang="en-US" smtClean="0"/>
-              <a:t>1/28/2017</a:t>
+              <a:t>7/13/2017</a:t>
             </a:fld>
             <a:endParaRPr lang="en-US"/>
           </a:p>
@@ -8968,7 +8968,7 @@
           <a:p>
             <a:fld id="{699DC775-C286-4358-8C92-D7E584E969B3}" type="datetimeFigureOut">
               <a:rPr lang="en-US" smtClean="0"/>
-              <a:t>1/28/2017</a:t>
+              <a:t>7/13/2017</a:t>
             </a:fld>
             <a:endParaRPr lang="en-US"/>
           </a:p>
@@ -9086,7 +9086,7 @@
           <a:p>
             <a:fld id="{699DC775-C286-4358-8C92-D7E584E969B3}" type="datetimeFigureOut">
               <a:rPr lang="en-US" smtClean="0"/>
-              <a:t>1/28/2017</a:t>
+              <a:t>7/13/2017</a:t>
             </a:fld>
             <a:endParaRPr lang="en-US"/>
           </a:p>
@@ -9181,7 +9181,7 @@
           <a:p>
             <a:fld id="{699DC775-C286-4358-8C92-D7E584E969B3}" type="datetimeFigureOut">
               <a:rPr lang="en-US" smtClean="0"/>
-              <a:t>1/28/2017</a:t>
+              <a:t>7/13/2017</a:t>
             </a:fld>
             <a:endParaRPr lang="en-US"/>
           </a:p>
@@ -9458,7 +9458,7 @@
           <a:p>
             <a:fld id="{699DC775-C286-4358-8C92-D7E584E969B3}" type="datetimeFigureOut">
               <a:rPr lang="en-US" smtClean="0"/>
-              <a:t>1/28/2017</a:t>
+              <a:t>7/13/2017</a:t>
             </a:fld>
             <a:endParaRPr lang="en-US"/>
           </a:p>
@@ -9711,7 +9711,7 @@
           <a:p>
             <a:fld id="{699DC775-C286-4358-8C92-D7E584E969B3}" type="datetimeFigureOut">
               <a:rPr lang="en-US" smtClean="0"/>
-              <a:t>1/28/2017</a:t>
+              <a:t>7/13/2017</a:t>
             </a:fld>
             <a:endParaRPr lang="en-US"/>
           </a:p>
@@ -9924,7 +9924,7 @@
           <a:p>
             <a:fld id="{699DC775-C286-4358-8C92-D7E584E969B3}" type="datetimeFigureOut">
               <a:rPr lang="en-US" smtClean="0"/>
-              <a:t>1/28/2017</a:t>
+              <a:t>7/13/2017</a:t>
             </a:fld>
             <a:endParaRPr lang="en-US"/>
           </a:p>
@@ -10439,7 +10439,7 @@
           <a:p>
             <a:fld id="{699DC775-C286-4358-8C92-D7E584E969B3}" type="datetimeFigureOut">
               <a:rPr lang="en-US" smtClean="0"/>
-              <a:t>1/28/2017</a:t>
+              <a:t>7/13/2017</a:t>
             </a:fld>
             <a:endParaRPr lang="en-US"/>
           </a:p>
@@ -10952,7 +10952,7 @@
           <a:p>
             <a:fld id="{699DC775-C286-4358-8C92-D7E584E969B3}" type="datetimeFigureOut">
               <a:rPr lang="en-US" smtClean="0"/>
-              <a:t>1/28/2017</a:t>
+              <a:t>7/13/2017</a:t>
             </a:fld>
             <a:endParaRPr lang="en-US"/>
           </a:p>
@@ -33055,66 +33055,30 @@
                             </p:childTnLst>
                           </p:cTn>
                         </p:par>
-                        <p:par>
-                          <p:cTn id="17" fill="hold">
-                            <p:stCondLst>
-                              <p:cond delay="1000"/>
-                            </p:stCondLst>
-                            <p:childTnLst>
-                              <p:par>
-                                <p:cTn id="18" presetID="1" presetClass="entr" presetSubtype="0" fill="hold" nodeType="afterEffect">
-                                  <p:stCondLst>
-                                    <p:cond delay="0"/>
-                                  </p:stCondLst>
-                                  <p:childTnLst>
-                                    <p:set>
-                                      <p:cBhvr>
-                                        <p:cTn id="19" dur="1" fill="hold">
-                                          <p:stCondLst>
-                                            <p:cond delay="0"/>
-                                          </p:stCondLst>
-                                        </p:cTn>
-                                        <p:tgtEl>
-                                          <p:spTgt spid="3"/>
-                                        </p:tgtEl>
-                                        <p:attrNameLst>
-                                          <p:attrName>style.visibility</p:attrName>
-                                        </p:attrNameLst>
-                                      </p:cBhvr>
-                                      <p:to>
-                                        <p:strVal val="visible"/>
-                                      </p:to>
-                                    </p:set>
-                                  </p:childTnLst>
-                                </p:cTn>
-                              </p:par>
-                            </p:childTnLst>
-                          </p:cTn>
-                        </p:par>
                       </p:childTnLst>
                     </p:cTn>
                   </p:par>
                   <p:par>
-                    <p:cTn id="20" fill="hold">
+                    <p:cTn id="17" fill="hold">
                       <p:stCondLst>
                         <p:cond delay="indefinite"/>
                       </p:stCondLst>
                       <p:childTnLst>
                         <p:par>
-                          <p:cTn id="21" fill="hold">
+                          <p:cTn id="18" fill="hold">
                             <p:stCondLst>
                               <p:cond delay="0"/>
                             </p:stCondLst>
                             <p:childTnLst>
                               <p:par>
-                                <p:cTn id="22" presetID="42" presetClass="path" presetSubtype="0" fill="hold" nodeType="clickEffect">
+                                <p:cTn id="19" presetID="42" presetClass="path" presetSubtype="0" fill="hold" nodeType="clickEffect">
                                   <p:stCondLst>
                                     <p:cond delay="0"/>
                                   </p:stCondLst>
                                   <p:childTnLst>
                                     <p:animMotion origin="layout" path="M 0 0 C 0.2171684 0.03356343 0.2171684 0.03356343 0.4343368 0.06712686 E" pathEditMode="relative" ptsTypes="">
                                       <p:cBhvr>
-                                        <p:cTn id="23" dur="500" fill="hold"/>
+                                        <p:cTn id="20" dur="500" fill="hold"/>
                                         <p:tgtEl>
                                           <p:spTgt spid="3"/>
                                         </p:tgtEl>
@@ -33128,14 +33092,14 @@
                                 </p:cTn>
                               </p:par>
                               <p:par>
-                                <p:cTn id="24" presetID="6" presetClass="emph" presetSubtype="0" fill="hold" nodeType="withEffect">
+                                <p:cTn id="21" presetID="6" presetClass="emph" presetSubtype="0" fill="hold" nodeType="withEffect">
                                   <p:stCondLst>
                                     <p:cond delay="0"/>
                                   </p:stCondLst>
                                   <p:childTnLst>
                                     <p:animScale>
                                       <p:cBhvr>
-                                        <p:cTn id="25" dur="500" fill="hold"/>
+                                        <p:cTn id="22" dur="500" fill="hold"/>
                                         <p:tgtEl>
                                           <p:spTgt spid="3"/>
                                         </p:tgtEl>
@@ -33146,14 +33110,14 @@
                                 </p:cTn>
                               </p:par>
                               <p:par>
-                                <p:cTn id="26" presetID="8" presetClass="emph" presetSubtype="0" fill="hold" nodeType="withEffect">
+                                <p:cTn id="23" presetID="8" presetClass="emph" presetSubtype="0" fill="hold" nodeType="withEffect">
                                   <p:stCondLst>
                                     <p:cond delay="0"/>
                                   </p:stCondLst>
                                   <p:childTnLst>
                                     <p:animRot by="5400004">
                                       <p:cBhvr>
-                                        <p:cTn id="27" dur="500" fill="hold"/>
+                                        <p:cTn id="24" dur="500" fill="hold"/>
                                         <p:tgtEl>
                                           <p:spTgt spid="3"/>
                                         </p:tgtEl>
@@ -33169,20 +33133,20 @@
                           </p:cTn>
                         </p:par>
                         <p:par>
-                          <p:cTn id="28" fill="hold">
+                          <p:cTn id="25" fill="hold">
                             <p:stCondLst>
                               <p:cond delay="500"/>
                             </p:stCondLst>
                             <p:childTnLst>
                               <p:par>
-                                <p:cTn id="29" presetID="1" presetClass="entr" presetSubtype="0" fill="hold" nodeType="afterEffect">
+                                <p:cTn id="26" presetID="1" presetClass="entr" presetSubtype="0" fill="hold" nodeType="afterEffect">
                                   <p:stCondLst>
                                     <p:cond delay="0"/>
                                   </p:stCondLst>
                                   <p:childTnLst>
                                     <p:set>
                                       <p:cBhvr>
-                                        <p:cTn id="30" dur="1" fill="hold">
+                                        <p:cTn id="27" dur="1" fill="hold">
                                           <p:stCondLst>
                                             <p:cond delay="0"/>
                                           </p:stCondLst>
@@ -33202,14 +33166,14 @@
                                 </p:cTn>
                               </p:par>
                               <p:par>
-                                <p:cTn id="31" presetID="10" presetClass="exit" presetSubtype="0" fill="hold" nodeType="withEffect">
+                                <p:cTn id="28" presetID="10" presetClass="exit" presetSubtype="0" fill="hold" nodeType="withEffect">
                                   <p:stCondLst>
                                     <p:cond delay="0"/>
                                   </p:stCondLst>
                                   <p:childTnLst>
                                     <p:animEffect transition="out" filter="fade">
                                       <p:cBhvr>
-                                        <p:cTn id="32" dur="500"/>
+                                        <p:cTn id="29" dur="500"/>
                                         <p:tgtEl>
                                           <p:spTgt spid="3"/>
                                         </p:tgtEl>
@@ -33217,7 +33181,7 @@
                                     </p:animEffect>
                                     <p:set>
                                       <p:cBhvr>
-                                        <p:cTn id="33" dur="1" fill="hold">
+                                        <p:cTn id="30" dur="1" fill="hold">
                                           <p:stCondLst>
                                             <p:cond delay="499"/>
                                           </p:stCondLst>
@@ -33237,14 +33201,14 @@
                                 </p:cTn>
                               </p:par>
                               <p:par>
-                                <p:cTn id="34" presetID="10" presetClass="exit" presetSubtype="0" fill="hold" grpId="0" nodeType="withEffect">
+                                <p:cTn id="31" presetID="10" presetClass="exit" presetSubtype="0" fill="hold" grpId="0" nodeType="withEffect">
                                   <p:stCondLst>
                                     <p:cond delay="0"/>
                                   </p:stCondLst>
                                   <p:childTnLst>
                                     <p:animEffect transition="out" filter="fade">
                                       <p:cBhvr>
-                                        <p:cTn id="35" dur="500"/>
+                                        <p:cTn id="32" dur="500"/>
                                         <p:tgtEl>
                                           <p:spTgt spid="38"/>
                                         </p:tgtEl>
@@ -33252,7 +33216,7 @@
                                     </p:animEffect>
                                     <p:set>
                                       <p:cBhvr>
-                                        <p:cTn id="36" dur="1" fill="hold">
+                                        <p:cTn id="33" dur="1" fill="hold">
                                           <p:stCondLst>
                                             <p:cond delay="499"/>
                                           </p:stCondLst>

</xml_diff>

<commit_message>
Remove redundant animations created during duplicate (#1513)
</commit_message>
<xml_diff>
--- a/doc/test/AnimationLab/AnimateInSlide.pptx
+++ b/doc/test/AnimationLab/AnimateInSlide.pptx
@@ -1595,7 +1595,7 @@
           <a:p>
             <a:fld id="{48E32F65-35C4-4EA7-AB30-C882F6C87A5D}" type="datetimeFigureOut">
               <a:rPr lang="en-SG" smtClean="0"/>
-              <a:t>1/28/2017</a:t>
+              <a:t>13/7/2017</a:t>
             </a:fld>
             <a:endParaRPr lang="en-SG"/>
           </a:p>
@@ -2482,7 +2482,7 @@
           <a:p>
             <a:fld id="{699DC775-C286-4358-8C92-D7E584E969B3}" type="datetimeFigureOut">
               <a:rPr lang="en-US" smtClean="0"/>
-              <a:t>1/28/2017</a:t>
+              <a:t>7/13/2017</a:t>
             </a:fld>
             <a:endParaRPr lang="en-US"/>
           </a:p>
@@ -2652,7 +2652,7 @@
           <a:p>
             <a:fld id="{699DC775-C286-4358-8C92-D7E584E969B3}" type="datetimeFigureOut">
               <a:rPr lang="en-US" smtClean="0"/>
-              <a:t>1/28/2017</a:t>
+              <a:t>7/13/2017</a:t>
             </a:fld>
             <a:endParaRPr lang="en-US"/>
           </a:p>
@@ -2832,7 +2832,7 @@
           <a:p>
             <a:fld id="{699DC775-C286-4358-8C92-D7E584E969B3}" type="datetimeFigureOut">
               <a:rPr lang="en-US" smtClean="0"/>
-              <a:t>1/28/2017</a:t>
+              <a:t>7/13/2017</a:t>
             </a:fld>
             <a:endParaRPr lang="en-US"/>
           </a:p>
@@ -3074,7 +3074,7 @@
           <a:p>
             <a:fld id="{699DC775-C286-4358-8C92-D7E584E969B3}" type="datetimeFigureOut">
               <a:rPr lang="en-US" smtClean="0"/>
-              <a:t>1/28/2017</a:t>
+              <a:t>7/13/2017</a:t>
             </a:fld>
             <a:endParaRPr lang="en-US"/>
           </a:p>
@@ -3244,7 +3244,7 @@
           <a:p>
             <a:fld id="{699DC775-C286-4358-8C92-D7E584E969B3}" type="datetimeFigureOut">
               <a:rPr lang="en-US" smtClean="0"/>
-              <a:t>1/28/2017</a:t>
+              <a:t>7/13/2017</a:t>
             </a:fld>
             <a:endParaRPr lang="en-US"/>
           </a:p>
@@ -3490,7 +3490,7 @@
           <a:p>
             <a:fld id="{699DC775-C286-4358-8C92-D7E584E969B3}" type="datetimeFigureOut">
               <a:rPr lang="en-US" smtClean="0"/>
-              <a:t>1/28/2017</a:t>
+              <a:t>7/13/2017</a:t>
             </a:fld>
             <a:endParaRPr lang="en-US"/>
           </a:p>
@@ -3778,7 +3778,7 @@
           <a:p>
             <a:fld id="{699DC775-C286-4358-8C92-D7E584E969B3}" type="datetimeFigureOut">
               <a:rPr lang="en-US" smtClean="0"/>
-              <a:t>1/28/2017</a:t>
+              <a:t>7/13/2017</a:t>
             </a:fld>
             <a:endParaRPr lang="en-US"/>
           </a:p>
@@ -4200,7 +4200,7 @@
           <a:p>
             <a:fld id="{699DC775-C286-4358-8C92-D7E584E969B3}" type="datetimeFigureOut">
               <a:rPr lang="en-US" smtClean="0"/>
-              <a:t>1/28/2017</a:t>
+              <a:t>7/13/2017</a:t>
             </a:fld>
             <a:endParaRPr lang="en-US"/>
           </a:p>
@@ -4318,7 +4318,7 @@
           <a:p>
             <a:fld id="{699DC775-C286-4358-8C92-D7E584E969B3}" type="datetimeFigureOut">
               <a:rPr lang="en-US" smtClean="0"/>
-              <a:t>1/28/2017</a:t>
+              <a:t>7/13/2017</a:t>
             </a:fld>
             <a:endParaRPr lang="en-US"/>
           </a:p>
@@ -4413,7 +4413,7 @@
           <a:p>
             <a:fld id="{699DC775-C286-4358-8C92-D7E584E969B3}" type="datetimeFigureOut">
               <a:rPr lang="en-US" smtClean="0"/>
-              <a:t>1/28/2017</a:t>
+              <a:t>7/13/2017</a:t>
             </a:fld>
             <a:endParaRPr lang="en-US"/>
           </a:p>
@@ -4690,7 +4690,7 @@
           <a:p>
             <a:fld id="{699DC775-C286-4358-8C92-D7E584E969B3}" type="datetimeFigureOut">
               <a:rPr lang="en-US" smtClean="0"/>
-              <a:t>1/28/2017</a:t>
+              <a:t>7/13/2017</a:t>
             </a:fld>
             <a:endParaRPr lang="en-US"/>
           </a:p>
@@ -4860,7 +4860,7 @@
           <a:p>
             <a:fld id="{699DC775-C286-4358-8C92-D7E584E969B3}" type="datetimeFigureOut">
               <a:rPr lang="en-US" smtClean="0"/>
-              <a:t>1/28/2017</a:t>
+              <a:t>7/13/2017</a:t>
             </a:fld>
             <a:endParaRPr lang="en-US"/>
           </a:p>
@@ -5113,7 +5113,7 @@
           <a:p>
             <a:fld id="{699DC775-C286-4358-8C92-D7E584E969B3}" type="datetimeFigureOut">
               <a:rPr lang="en-US" smtClean="0"/>
-              <a:t>1/28/2017</a:t>
+              <a:t>7/13/2017</a:t>
             </a:fld>
             <a:endParaRPr lang="en-US"/>
           </a:p>
@@ -5283,7 +5283,7 @@
           <a:p>
             <a:fld id="{699DC775-C286-4358-8C92-D7E584E969B3}" type="datetimeFigureOut">
               <a:rPr lang="en-US" smtClean="0"/>
-              <a:t>1/28/2017</a:t>
+              <a:t>7/13/2017</a:t>
             </a:fld>
             <a:endParaRPr lang="en-US"/>
           </a:p>
@@ -5463,7 +5463,7 @@
           <a:p>
             <a:fld id="{699DC775-C286-4358-8C92-D7E584E969B3}" type="datetimeFigureOut">
               <a:rPr lang="en-US" smtClean="0"/>
-              <a:t>1/28/2017</a:t>
+              <a:t>7/13/2017</a:t>
             </a:fld>
             <a:endParaRPr lang="en-US"/>
           </a:p>
@@ -5713,7 +5713,7 @@
           <a:p>
             <a:fld id="{699DC775-C286-4358-8C92-D7E584E969B3}" type="datetimeFigureOut">
               <a:rPr lang="en-US" smtClean="0"/>
-              <a:t>1/28/2017</a:t>
+              <a:t>7/13/2017</a:t>
             </a:fld>
             <a:endParaRPr lang="en-US"/>
           </a:p>
@@ -5891,7 +5891,7 @@
           <a:p>
             <a:fld id="{699DC775-C286-4358-8C92-D7E584E969B3}" type="datetimeFigureOut">
               <a:rPr lang="en-US" smtClean="0"/>
-              <a:t>1/28/2017</a:t>
+              <a:t>7/13/2017</a:t>
             </a:fld>
             <a:endParaRPr lang="en-US"/>
           </a:p>
@@ -6145,7 +6145,7 @@
           <a:p>
             <a:fld id="{699DC775-C286-4358-8C92-D7E584E969B3}" type="datetimeFigureOut">
               <a:rPr lang="en-US" smtClean="0"/>
-              <a:t>1/28/2017</a:t>
+              <a:t>7/13/2017</a:t>
             </a:fld>
             <a:endParaRPr lang="en-US"/>
           </a:p>
@@ -6441,7 +6441,7 @@
           <a:p>
             <a:fld id="{699DC775-C286-4358-8C92-D7E584E969B3}" type="datetimeFigureOut">
               <a:rPr lang="en-US" smtClean="0"/>
-              <a:t>1/28/2017</a:t>
+              <a:t>7/13/2017</a:t>
             </a:fld>
             <a:endParaRPr lang="en-US"/>
           </a:p>
@@ -6871,7 +6871,7 @@
           <a:p>
             <a:fld id="{699DC775-C286-4358-8C92-D7E584E969B3}" type="datetimeFigureOut">
               <a:rPr lang="en-US" smtClean="0"/>
-              <a:t>1/28/2017</a:t>
+              <a:t>7/13/2017</a:t>
             </a:fld>
             <a:endParaRPr lang="en-US"/>
           </a:p>
@@ -6997,7 +6997,7 @@
           <a:p>
             <a:fld id="{699DC775-C286-4358-8C92-D7E584E969B3}" type="datetimeFigureOut">
               <a:rPr lang="en-US" smtClean="0"/>
-              <a:t>1/28/2017</a:t>
+              <a:t>7/13/2017</a:t>
             </a:fld>
             <a:endParaRPr lang="en-US"/>
           </a:p>
@@ -7100,7 +7100,7 @@
           <a:p>
             <a:fld id="{699DC775-C286-4358-8C92-D7E584E969B3}" type="datetimeFigureOut">
               <a:rPr lang="en-US" smtClean="0"/>
-              <a:t>1/28/2017</a:t>
+              <a:t>7/13/2017</a:t>
             </a:fld>
             <a:endParaRPr lang="en-US"/>
           </a:p>
@@ -7346,7 +7346,7 @@
           <a:p>
             <a:fld id="{699DC775-C286-4358-8C92-D7E584E969B3}" type="datetimeFigureOut">
               <a:rPr lang="en-US" smtClean="0"/>
-              <a:t>1/28/2017</a:t>
+              <a:t>7/13/2017</a:t>
             </a:fld>
             <a:endParaRPr lang="en-US"/>
           </a:p>
@@ -7631,7 +7631,7 @@
           <a:p>
             <a:fld id="{699DC775-C286-4358-8C92-D7E584E969B3}" type="datetimeFigureOut">
               <a:rPr lang="en-US" smtClean="0"/>
-              <a:t>1/28/2017</a:t>
+              <a:t>7/13/2017</a:t>
             </a:fld>
             <a:endParaRPr lang="en-US"/>
           </a:p>
@@ -7892,7 +7892,7 @@
           <a:p>
             <a:fld id="{699DC775-C286-4358-8C92-D7E584E969B3}" type="datetimeFigureOut">
               <a:rPr lang="en-US" smtClean="0"/>
-              <a:t>1/28/2017</a:t>
+              <a:t>7/13/2017</a:t>
             </a:fld>
             <a:endParaRPr lang="en-US"/>
           </a:p>
@@ -8070,7 +8070,7 @@
           <a:p>
             <a:fld id="{699DC775-C286-4358-8C92-D7E584E969B3}" type="datetimeFigureOut">
               <a:rPr lang="en-US" smtClean="0"/>
-              <a:t>1/28/2017</a:t>
+              <a:t>7/13/2017</a:t>
             </a:fld>
             <a:endParaRPr lang="en-US"/>
           </a:p>
@@ -8258,7 +8258,7 @@
           <a:p>
             <a:fld id="{699DC775-C286-4358-8C92-D7E584E969B3}" type="datetimeFigureOut">
               <a:rPr lang="en-US" smtClean="0"/>
-              <a:t>1/28/2017</a:t>
+              <a:t>7/13/2017</a:t>
             </a:fld>
             <a:endParaRPr lang="en-US"/>
           </a:p>
@@ -8546,7 +8546,7 @@
           <a:p>
             <a:fld id="{699DC775-C286-4358-8C92-D7E584E969B3}" type="datetimeFigureOut">
               <a:rPr lang="en-US" smtClean="0"/>
-              <a:t>1/28/2017</a:t>
+              <a:t>7/13/2017</a:t>
             </a:fld>
             <a:endParaRPr lang="en-US"/>
           </a:p>
@@ -8968,7 +8968,7 @@
           <a:p>
             <a:fld id="{699DC775-C286-4358-8C92-D7E584E969B3}" type="datetimeFigureOut">
               <a:rPr lang="en-US" smtClean="0"/>
-              <a:t>1/28/2017</a:t>
+              <a:t>7/13/2017</a:t>
             </a:fld>
             <a:endParaRPr lang="en-US"/>
           </a:p>
@@ -9086,7 +9086,7 @@
           <a:p>
             <a:fld id="{699DC775-C286-4358-8C92-D7E584E969B3}" type="datetimeFigureOut">
               <a:rPr lang="en-US" smtClean="0"/>
-              <a:t>1/28/2017</a:t>
+              <a:t>7/13/2017</a:t>
             </a:fld>
             <a:endParaRPr lang="en-US"/>
           </a:p>
@@ -9181,7 +9181,7 @@
           <a:p>
             <a:fld id="{699DC775-C286-4358-8C92-D7E584E969B3}" type="datetimeFigureOut">
               <a:rPr lang="en-US" smtClean="0"/>
-              <a:t>1/28/2017</a:t>
+              <a:t>7/13/2017</a:t>
             </a:fld>
             <a:endParaRPr lang="en-US"/>
           </a:p>
@@ -9458,7 +9458,7 @@
           <a:p>
             <a:fld id="{699DC775-C286-4358-8C92-D7E584E969B3}" type="datetimeFigureOut">
               <a:rPr lang="en-US" smtClean="0"/>
-              <a:t>1/28/2017</a:t>
+              <a:t>7/13/2017</a:t>
             </a:fld>
             <a:endParaRPr lang="en-US"/>
           </a:p>
@@ -9711,7 +9711,7 @@
           <a:p>
             <a:fld id="{699DC775-C286-4358-8C92-D7E584E969B3}" type="datetimeFigureOut">
               <a:rPr lang="en-US" smtClean="0"/>
-              <a:t>1/28/2017</a:t>
+              <a:t>7/13/2017</a:t>
             </a:fld>
             <a:endParaRPr lang="en-US"/>
           </a:p>
@@ -9924,7 +9924,7 @@
           <a:p>
             <a:fld id="{699DC775-C286-4358-8C92-D7E584E969B3}" type="datetimeFigureOut">
               <a:rPr lang="en-US" smtClean="0"/>
-              <a:t>1/28/2017</a:t>
+              <a:t>7/13/2017</a:t>
             </a:fld>
             <a:endParaRPr lang="en-US"/>
           </a:p>
@@ -10439,7 +10439,7 @@
           <a:p>
             <a:fld id="{699DC775-C286-4358-8C92-D7E584E969B3}" type="datetimeFigureOut">
               <a:rPr lang="en-US" smtClean="0"/>
-              <a:t>1/28/2017</a:t>
+              <a:t>7/13/2017</a:t>
             </a:fld>
             <a:endParaRPr lang="en-US"/>
           </a:p>
@@ -10952,7 +10952,7 @@
           <a:p>
             <a:fld id="{699DC775-C286-4358-8C92-D7E584E969B3}" type="datetimeFigureOut">
               <a:rPr lang="en-US" smtClean="0"/>
-              <a:t>1/28/2017</a:t>
+              <a:t>7/13/2017</a:t>
             </a:fld>
             <a:endParaRPr lang="en-US"/>
           </a:p>
@@ -33055,66 +33055,30 @@
                             </p:childTnLst>
                           </p:cTn>
                         </p:par>
-                        <p:par>
-                          <p:cTn id="17" fill="hold">
-                            <p:stCondLst>
-                              <p:cond delay="1000"/>
-                            </p:stCondLst>
-                            <p:childTnLst>
-                              <p:par>
-                                <p:cTn id="18" presetID="1" presetClass="entr" presetSubtype="0" fill="hold" nodeType="afterEffect">
-                                  <p:stCondLst>
-                                    <p:cond delay="0"/>
-                                  </p:stCondLst>
-                                  <p:childTnLst>
-                                    <p:set>
-                                      <p:cBhvr>
-                                        <p:cTn id="19" dur="1" fill="hold">
-                                          <p:stCondLst>
-                                            <p:cond delay="0"/>
-                                          </p:stCondLst>
-                                        </p:cTn>
-                                        <p:tgtEl>
-                                          <p:spTgt spid="3"/>
-                                        </p:tgtEl>
-                                        <p:attrNameLst>
-                                          <p:attrName>style.visibility</p:attrName>
-                                        </p:attrNameLst>
-                                      </p:cBhvr>
-                                      <p:to>
-                                        <p:strVal val="visible"/>
-                                      </p:to>
-                                    </p:set>
-                                  </p:childTnLst>
-                                </p:cTn>
-                              </p:par>
-                            </p:childTnLst>
-                          </p:cTn>
-                        </p:par>
                       </p:childTnLst>
                     </p:cTn>
                   </p:par>
                   <p:par>
-                    <p:cTn id="20" fill="hold">
+                    <p:cTn id="17" fill="hold">
                       <p:stCondLst>
                         <p:cond delay="indefinite"/>
                       </p:stCondLst>
                       <p:childTnLst>
                         <p:par>
-                          <p:cTn id="21" fill="hold">
+                          <p:cTn id="18" fill="hold">
                             <p:stCondLst>
                               <p:cond delay="0"/>
                             </p:stCondLst>
                             <p:childTnLst>
                               <p:par>
-                                <p:cTn id="22" presetID="42" presetClass="path" presetSubtype="0" fill="hold" nodeType="clickEffect">
+                                <p:cTn id="19" presetID="42" presetClass="path" presetSubtype="0" fill="hold" nodeType="clickEffect">
                                   <p:stCondLst>
                                     <p:cond delay="0"/>
                                   </p:stCondLst>
                                   <p:childTnLst>
                                     <p:animMotion origin="layout" path="M 0 0 C 0.2171684 0.03356343 0.2171684 0.03356343 0.4343368 0.06712686 E" pathEditMode="relative" ptsTypes="">
                                       <p:cBhvr>
-                                        <p:cTn id="23" dur="500" fill="hold"/>
+                                        <p:cTn id="20" dur="500" fill="hold"/>
                                         <p:tgtEl>
                                           <p:spTgt spid="3"/>
                                         </p:tgtEl>
@@ -33128,14 +33092,14 @@
                                 </p:cTn>
                               </p:par>
                               <p:par>
-                                <p:cTn id="24" presetID="6" presetClass="emph" presetSubtype="0" fill="hold" nodeType="withEffect">
+                                <p:cTn id="21" presetID="6" presetClass="emph" presetSubtype="0" fill="hold" nodeType="withEffect">
                                   <p:stCondLst>
                                     <p:cond delay="0"/>
                                   </p:stCondLst>
                                   <p:childTnLst>
                                     <p:animScale>
                                       <p:cBhvr>
-                                        <p:cTn id="25" dur="500" fill="hold"/>
+                                        <p:cTn id="22" dur="500" fill="hold"/>
                                         <p:tgtEl>
                                           <p:spTgt spid="3"/>
                                         </p:tgtEl>
@@ -33146,14 +33110,14 @@
                                 </p:cTn>
                               </p:par>
                               <p:par>
-                                <p:cTn id="26" presetID="8" presetClass="emph" presetSubtype="0" fill="hold" nodeType="withEffect">
+                                <p:cTn id="23" presetID="8" presetClass="emph" presetSubtype="0" fill="hold" nodeType="withEffect">
                                   <p:stCondLst>
                                     <p:cond delay="0"/>
                                   </p:stCondLst>
                                   <p:childTnLst>
                                     <p:animRot by="5400004">
                                       <p:cBhvr>
-                                        <p:cTn id="27" dur="500" fill="hold"/>
+                                        <p:cTn id="24" dur="500" fill="hold"/>
                                         <p:tgtEl>
                                           <p:spTgt spid="3"/>
                                         </p:tgtEl>
@@ -33169,20 +33133,20 @@
                           </p:cTn>
                         </p:par>
                         <p:par>
-                          <p:cTn id="28" fill="hold">
+                          <p:cTn id="25" fill="hold">
                             <p:stCondLst>
                               <p:cond delay="500"/>
                             </p:stCondLst>
                             <p:childTnLst>
                               <p:par>
-                                <p:cTn id="29" presetID="1" presetClass="entr" presetSubtype="0" fill="hold" nodeType="afterEffect">
+                                <p:cTn id="26" presetID="1" presetClass="entr" presetSubtype="0" fill="hold" nodeType="afterEffect">
                                   <p:stCondLst>
                                     <p:cond delay="0"/>
                                   </p:stCondLst>
                                   <p:childTnLst>
                                     <p:set>
                                       <p:cBhvr>
-                                        <p:cTn id="30" dur="1" fill="hold">
+                                        <p:cTn id="27" dur="1" fill="hold">
                                           <p:stCondLst>
                                             <p:cond delay="0"/>
                                           </p:stCondLst>
@@ -33202,14 +33166,14 @@
                                 </p:cTn>
                               </p:par>
                               <p:par>
-                                <p:cTn id="31" presetID="10" presetClass="exit" presetSubtype="0" fill="hold" nodeType="withEffect">
+                                <p:cTn id="28" presetID="10" presetClass="exit" presetSubtype="0" fill="hold" nodeType="withEffect">
                                   <p:stCondLst>
                                     <p:cond delay="0"/>
                                   </p:stCondLst>
                                   <p:childTnLst>
                                     <p:animEffect transition="out" filter="fade">
                                       <p:cBhvr>
-                                        <p:cTn id="32" dur="500"/>
+                                        <p:cTn id="29" dur="500"/>
                                         <p:tgtEl>
                                           <p:spTgt spid="3"/>
                                         </p:tgtEl>
@@ -33217,7 +33181,7 @@
                                     </p:animEffect>
                                     <p:set>
                                       <p:cBhvr>
-                                        <p:cTn id="33" dur="1" fill="hold">
+                                        <p:cTn id="30" dur="1" fill="hold">
                                           <p:stCondLst>
                                             <p:cond delay="499"/>
                                           </p:stCondLst>
@@ -33237,14 +33201,14 @@
                                 </p:cTn>
                               </p:par>
                               <p:par>
-                                <p:cTn id="34" presetID="10" presetClass="exit" presetSubtype="0" fill="hold" grpId="0" nodeType="withEffect">
+                                <p:cTn id="31" presetID="10" presetClass="exit" presetSubtype="0" fill="hold" grpId="0" nodeType="withEffect">
                                   <p:stCondLst>
                                     <p:cond delay="0"/>
                                   </p:stCondLst>
                                   <p:childTnLst>
                                     <p:animEffect transition="out" filter="fade">
                                       <p:cBhvr>
-                                        <p:cTn id="35" dur="500"/>
+                                        <p:cTn id="32" dur="500"/>
                                         <p:tgtEl>
                                           <p:spTgt spid="38"/>
                                         </p:tgtEl>
@@ -33252,7 +33216,7 @@
                                     </p:animEffect>
                                     <p:set>
                                       <p:cBhvr>
-                                        <p:cTn id="36" dur="1" fill="hold">
+                                        <p:cTn id="33" dur="1" fill="hold">
                                           <p:stCondLst>
                                             <p:cond delay="499"/>
                                           </p:stCondLst>

</xml_diff>